<commit_message>
update before open source meeting
</commit_message>
<xml_diff>
--- a/docs/modules/ROOT/pages/high_level/AGA_design.pptx
+++ b/docs/modules/ROOT/pages/high_level/AGA_design.pptx
@@ -1087,6 +1087,116 @@
     <p:extLst>
       <p:ext uri="{BB962C8B-B14F-4D97-AF65-F5344CB8AC3E}">
         <p14:creationId xmlns:p14="http://schemas.microsoft.com/office/powerpoint/2010/main" val="1830571748"/>
+      </p:ext>
+    </p:extLst>
+  </p:cSld>
+  <p:clrMapOvr>
+    <a:masterClrMapping/>
+  </p:clrMapOvr>
+</p:notes>
+</file>
+
+<file path=ppt/notesSlides/notesSlide6.xml><?xml version="1.0" encoding="utf-8"?>
+<p:notes xmlns:a="http://schemas.openxmlformats.org/drawingml/2006/main" xmlns:r="http://schemas.openxmlformats.org/officeDocument/2006/relationships" xmlns:p="http://schemas.openxmlformats.org/presentationml/2006/main">
+  <p:cSld>
+    <p:spTree>
+      <p:nvGrpSpPr>
+        <p:cNvPr id="1" name=""/>
+        <p:cNvGrpSpPr/>
+        <p:nvPr/>
+      </p:nvGrpSpPr>
+      <p:grpSpPr>
+        <a:xfrm>
+          <a:off x="0" y="0"/>
+          <a:ext cx="0" cy="0"/>
+          <a:chOff x="0" y="0"/>
+          <a:chExt cx="0" cy="0"/>
+        </a:xfrm>
+      </p:grpSpPr>
+      <p:sp>
+        <p:nvSpPr>
+          <p:cNvPr id="2" name="Slide Image Placeholder 1"/>
+          <p:cNvSpPr>
+            <a:spLocks noGrp="1" noRot="1" noChangeAspect="1"/>
+          </p:cNvSpPr>
+          <p:nvPr>
+            <p:ph type="sldImg"/>
+          </p:nvPr>
+        </p:nvSpPr>
+        <p:spPr/>
+      </p:sp>
+      <p:sp>
+        <p:nvSpPr>
+          <p:cNvPr id="3" name="Notes Placeholder 2"/>
+          <p:cNvSpPr>
+            <a:spLocks noGrp="1"/>
+          </p:cNvSpPr>
+          <p:nvPr>
+            <p:ph type="body" idx="1"/>
+          </p:nvPr>
+        </p:nvSpPr>
+        <p:spPr/>
+        <p:txBody>
+          <a:bodyPr/>
+          <a:lstStyle/>
+          <a:p>
+            <a:r>
+              <a:rPr lang="en-US" dirty="0"/>
+              <a:t>ACA states: restarted-&gt;running-&gt;</a:t>
+            </a:r>
+            <a:r>
+              <a:rPr lang="en-US" dirty="0" err="1"/>
+              <a:t>out_of_order</a:t>
+            </a:r>
+            <a:r>
+              <a:rPr lang="en-US" dirty="0"/>
+              <a:t>(?)-&gt;</a:t>
+            </a:r>
+            <a:r>
+              <a:rPr lang="en-US" dirty="0" err="1"/>
+              <a:t>unheathly</a:t>
+            </a:r>
+            <a:r>
+              <a:rPr lang="en-US" dirty="0"/>
+              <a:t>(?) </a:t>
+            </a:r>
+          </a:p>
+          <a:p>
+            <a:pPr lvl="1"/>
+            <a:r>
+              <a:rPr lang="en-US"/>
+              <a:t>Note: not sure the need for ACA states</a:t>
+            </a:r>
+          </a:p>
+        </p:txBody>
+      </p:sp>
+      <p:sp>
+        <p:nvSpPr>
+          <p:cNvPr id="4" name="Slide Number Placeholder 3"/>
+          <p:cNvSpPr>
+            <a:spLocks noGrp="1"/>
+          </p:cNvSpPr>
+          <p:nvPr>
+            <p:ph type="sldNum" sz="quarter" idx="5"/>
+          </p:nvPr>
+        </p:nvSpPr>
+        <p:spPr/>
+        <p:txBody>
+          <a:bodyPr/>
+          <a:lstStyle/>
+          <a:p>
+            <a:fld id="{3B8F7B5A-F07A-D34B-B7A1-626E768F04C8}" type="slidenum">
+              <a:rPr lang="en-US" smtClean="0"/>
+              <a:t>24</a:t>
+            </a:fld>
+            <a:endParaRPr lang="en-US"/>
+          </a:p>
+        </p:txBody>
+      </p:sp>
+    </p:spTree>
+    <p:extLst>
+      <p:ext uri="{BB962C8B-B14F-4D97-AF65-F5344CB8AC3E}">
+        <p14:creationId xmlns:p14="http://schemas.microsoft.com/office/powerpoint/2010/main" val="2054535173"/>
       </p:ext>
     </p:extLst>
   </p:cSld>
@@ -5834,12 +5944,16 @@
         </p:spPr>
         <p:txBody>
           <a:bodyPr>
-            <a:normAutofit fontScale="70000" lnSpcReduction="20000"/>
+            <a:normAutofit fontScale="85000" lnSpcReduction="20000"/>
           </a:bodyPr>
           <a:lstStyle/>
           <a:p>
             <a:r>
-              <a:rPr lang="en-US" u="sng" dirty="0"/>
+              <a:rPr lang="en-US" u="sng" dirty="0">
+                <a:solidFill>
+                  <a:srgbClr val="FF0000"/>
+                </a:solidFill>
+              </a:rPr>
               <a:t>AGA act as configuration cache</a:t>
             </a:r>
           </a:p>
@@ -5946,7 +6060,15 @@
             </a:r>
             <a:r>
               <a:rPr lang="en-US" dirty="0"/>
-              <a:t> send down to the corresponding ACA host</a:t>
+              <a:t> </a:t>
+            </a:r>
+            <a:r>
+              <a:rPr lang="en-US" dirty="0">
+                <a:solidFill>
+                  <a:srgbClr val="FF0000"/>
+                </a:solidFill>
+              </a:rPr>
+              <a:t>send down to the corresponding ACA host</a:t>
             </a:r>
           </a:p>
           <a:p>
@@ -5978,20 +6100,6 @@
             <a:r>
               <a:rPr lang="en-US" dirty="0"/>
               <a:t>Need to define the workflow and schema</a:t>
-            </a:r>
-          </a:p>
-          <a:p>
-            <a:pPr lvl="1"/>
-            <a:r>
-              <a:rPr lang="en-US" dirty="0"/>
-              <a:t>Need to define the logic in AGA because only destination IP is available, no resource ID</a:t>
-            </a:r>
-          </a:p>
-          <a:p>
-            <a:pPr lvl="1"/>
-            <a:r>
-              <a:rPr lang="en-US" dirty="0"/>
-              <a:t>AGA will need to request from DPM if AGA doesn’t have the info, what happen if a VM keep requesting random destinations? Need to define the workflow and schema</a:t>
             </a:r>
           </a:p>
           <a:p>
@@ -7718,7 +7826,11 @@
           <a:lstStyle/>
           <a:p>
             <a:r>
-              <a:rPr lang="en-US" u="sng" dirty="0"/>
+              <a:rPr lang="en-US" u="sng" dirty="0">
+                <a:solidFill>
+                  <a:srgbClr val="FF0000"/>
+                </a:solidFill>
+              </a:rPr>
               <a:t>AGA act as configuration cache or passthrough proxy</a:t>
             </a:r>
           </a:p>
@@ -9542,7 +9654,11 @@
           <a:lstStyle/>
           <a:p>
             <a:r>
-              <a:rPr lang="en-US" u="sng" dirty="0"/>
+              <a:rPr lang="en-US" u="sng" dirty="0">
+                <a:solidFill>
+                  <a:srgbClr val="FF0000"/>
+                </a:solidFill>
+              </a:rPr>
               <a:t>AGA act as configuration cache or passthrough proxy</a:t>
             </a:r>
           </a:p>
@@ -9651,7 +9767,7 @@
             <a:pPr lvl="1"/>
             <a:r>
               <a:rPr lang="en-US" dirty="0"/>
-              <a:t>Update the delete neighbor full state (thinking to keep it instead of deleting the resource entry just in case if ACA ask for it for OOO handling)</a:t>
+              <a:t>Update the delete neighbor full state (delete it or keep it for out of order handling?)</a:t>
             </a:r>
           </a:p>
           <a:p>
@@ -11325,7 +11441,11 @@
           <a:lstStyle/>
           <a:p>
             <a:r>
-              <a:rPr lang="en-US" u="sng" dirty="0"/>
+              <a:rPr lang="en-US" u="sng" dirty="0">
+                <a:solidFill>
+                  <a:srgbClr val="FF0000"/>
+                </a:solidFill>
+              </a:rPr>
               <a:t>AGA act as passthrough proxy</a:t>
             </a:r>
           </a:p>
@@ -13044,7 +13164,11 @@
           <a:lstStyle/>
           <a:p>
             <a:r>
-              <a:rPr lang="en-US" u="sng" dirty="0"/>
+              <a:rPr lang="en-US" u="sng" dirty="0">
+                <a:solidFill>
+                  <a:srgbClr val="FF0000"/>
+                </a:solidFill>
+              </a:rPr>
               <a:t>AGA act as passthrough proxy</a:t>
             </a:r>
           </a:p>
@@ -14843,7 +14967,11 @@
           <a:lstStyle/>
           <a:p>
             <a:r>
-              <a:rPr lang="en-US" u="sng" dirty="0"/>
+              <a:rPr lang="en-US" u="sng" dirty="0">
+                <a:solidFill>
+                  <a:srgbClr val="FF0000"/>
+                </a:solidFill>
+              </a:rPr>
               <a:t>AGA act as configuration cache</a:t>
             </a:r>
           </a:p>
@@ -14988,7 +15116,15 @@
             </a:r>
             <a:r>
               <a:rPr lang="en-US" dirty="0"/>
-              <a:t> send down to the corresponding ACA host</a:t>
+              <a:t> </a:t>
+            </a:r>
+            <a:r>
+              <a:rPr lang="en-US" dirty="0">
+                <a:solidFill>
+                  <a:srgbClr val="FF0000"/>
+                </a:solidFill>
+              </a:rPr>
+              <a:t>send down to the corresponding ACA host</a:t>
             </a:r>
           </a:p>
           <a:p>
@@ -16737,7 +16873,11 @@
           <a:lstStyle/>
           <a:p>
             <a:r>
-              <a:rPr lang="en-US" u="sng" dirty="0"/>
+              <a:rPr lang="en-US" u="sng" dirty="0">
+                <a:solidFill>
+                  <a:srgbClr val="FF0000"/>
+                </a:solidFill>
+              </a:rPr>
               <a:t>AGA act as configuration cache</a:t>
             </a:r>
           </a:p>
@@ -18811,7 +18951,11 @@
           <a:lstStyle/>
           <a:p>
             <a:r>
-              <a:rPr lang="en-US" u="sng" dirty="0"/>
+              <a:rPr lang="en-US" u="sng" dirty="0">
+                <a:solidFill>
+                  <a:srgbClr val="FF0000"/>
+                </a:solidFill>
+              </a:rPr>
               <a:t>AGA act as configuration cache</a:t>
             </a:r>
           </a:p>
@@ -18936,7 +19080,7 @@
                   <a:srgbClr val="FF0000"/>
                 </a:solidFill>
               </a:rPr>
-              <a:t>NSH header is 8 Bytes, so total ~88 Bytes</a:t>
+              <a:t>NSH header is 8 Bytes + 4 Bytes metadata header, so total ~92 Bytes</a:t>
             </a:r>
           </a:p>
           <a:p>
@@ -18967,7 +19111,7 @@
                   <a:srgbClr val="FF0000"/>
                 </a:solidFill>
               </a:rPr>
-              <a:t>If we can reduce the SG ID size or accept the current 88 Bytes overhead, we don’t need to pre-negotiate a new SG label, and we can simply download all ingress SG rules</a:t>
+              <a:t>If we can reduce the SG ID size or accept the current 92 Bytes overhead, we don’t need to pre-negotiate a new SG label, and we can simply download all ingress SG rules</a:t>
             </a:r>
           </a:p>
         </p:txBody>
@@ -21049,31 +21193,7 @@
                 <a:latin typeface="Consolas" panose="020B0609020204030204" pitchFamily="49" charset="0"/>
                 <a:cs typeface="Consolas" panose="020B0609020204030204" pitchFamily="49" charset="0"/>
               </a:rPr>
-              <a:t>|          Metadata Class       |      Type     |U|       Len   |</a:t>
-            </a:r>
-          </a:p>
-          <a:p>
-            <a:pPr marL="0" indent="0">
-              <a:buNone/>
-            </a:pPr>
-            <a:r>
-              <a:rPr lang="en-US" sz="1400" dirty="0">
-                <a:latin typeface="Consolas" panose="020B0609020204030204" pitchFamily="49" charset="0"/>
-                <a:cs typeface="Consolas" panose="020B0609020204030204" pitchFamily="49" charset="0"/>
-              </a:rPr>
-              <a:t>+-+-+-+-+-+-+-+-+-+-+-+-+-+-+-+-+-+-+-+-+-+-+-+-+-+-+-+-+-+-+-+-+</a:t>
-            </a:r>
-          </a:p>
-          <a:p>
-            <a:pPr marL="0" indent="0">
-              <a:buNone/>
-            </a:pPr>
-            <a:r>
-              <a:rPr lang="en-US" sz="1400" dirty="0">
-                <a:latin typeface="Consolas" panose="020B0609020204030204" pitchFamily="49" charset="0"/>
-                <a:cs typeface="Consolas" panose="020B0609020204030204" pitchFamily="49" charset="0"/>
-              </a:rPr>
-              <a:t>|       Variable Metadata - </a:t>
+              <a:t>|          </a:t>
             </a:r>
             <a:r>
               <a:rPr lang="en-US" sz="1400" dirty="0">
@@ -21083,7 +21203,48 @@
                 <a:latin typeface="Consolas" panose="020B0609020204030204" pitchFamily="49" charset="0"/>
                 <a:cs typeface="Consolas" panose="020B0609020204030204" pitchFamily="49" charset="0"/>
               </a:rPr>
-              <a:t>start the 16 Bytes SG IDs here      </a:t>
+              <a:t>Metadata Class       |      Type     |U|       Len   </a:t>
+            </a:r>
+            <a:r>
+              <a:rPr lang="en-US" sz="1400" dirty="0">
+                <a:latin typeface="Consolas" panose="020B0609020204030204" pitchFamily="49" charset="0"/>
+                <a:cs typeface="Consolas" panose="020B0609020204030204" pitchFamily="49" charset="0"/>
+              </a:rPr>
+              <a:t>|</a:t>
+            </a:r>
+          </a:p>
+          <a:p>
+            <a:pPr marL="0" indent="0">
+              <a:buNone/>
+            </a:pPr>
+            <a:r>
+              <a:rPr lang="en-US" sz="1400" dirty="0">
+                <a:latin typeface="Consolas" panose="020B0609020204030204" pitchFamily="49" charset="0"/>
+                <a:cs typeface="Consolas" panose="020B0609020204030204" pitchFamily="49" charset="0"/>
+              </a:rPr>
+              <a:t>+-+-+-+-+-+-+-+-+-+-+-+-+-+-+-+-+-+-+-+-+-+-+-+-+-+-+-+-+-+-+-+-+</a:t>
+            </a:r>
+          </a:p>
+          <a:p>
+            <a:pPr marL="0" indent="0">
+              <a:buNone/>
+            </a:pPr>
+            <a:r>
+              <a:rPr lang="en-US" sz="1400" dirty="0">
+                <a:latin typeface="Consolas" panose="020B0609020204030204" pitchFamily="49" charset="0"/>
+                <a:cs typeface="Consolas" panose="020B0609020204030204" pitchFamily="49" charset="0"/>
+              </a:rPr>
+              <a:t>|       </a:t>
+            </a:r>
+            <a:r>
+              <a:rPr lang="en-US" sz="1400" dirty="0">
+                <a:solidFill>
+                  <a:srgbClr val="FF0000"/>
+                </a:solidFill>
+                <a:latin typeface="Consolas" panose="020B0609020204030204" pitchFamily="49" charset="0"/>
+                <a:cs typeface="Consolas" panose="020B0609020204030204" pitchFamily="49" charset="0"/>
+              </a:rPr>
+              <a:t>Variable Metadata - start the 16 Bytes SG IDs here      </a:t>
             </a:r>
             <a:r>
               <a:rPr lang="en-US" sz="1400" dirty="0">
@@ -25179,8 +25340,8 @@
         </p:nvSpPr>
         <p:spPr>
           <a:xfrm>
-            <a:off x="10438162" y="3087512"/>
-            <a:ext cx="1719573" cy="369332"/>
+            <a:off x="7585875" y="3095273"/>
+            <a:ext cx="3303341" cy="369332"/>
           </a:xfrm>
           <a:prstGeom prst="rect">
             <a:avLst/>
@@ -25202,7 +25363,7 @@
                   </a:schemeClr>
                 </a:solidFill>
               </a:rPr>
-              <a:t>Group/Cluster N</a:t>
+              <a:t>Group/Cluster N 10.24.1.111-222</a:t>
             </a:r>
           </a:p>
         </p:txBody>
@@ -25320,7 +25481,7 @@
         <p:spPr>
           <a:xfrm>
             <a:off x="8968330" y="1138287"/>
-            <a:ext cx="2904065" cy="2062103"/>
+            <a:ext cx="2904065" cy="1384995"/>
           </a:xfrm>
           <a:prstGeom prst="rect">
             <a:avLst/>
@@ -25364,18 +25525,6 @@
               <a:rPr lang="en-US" sz="1400" dirty="0"/>
               <a:t>Target IP, output AGA ID+IP</a:t>
             </a:r>
-          </a:p>
-          <a:p>
-            <a:endParaRPr lang="en-US" sz="1400" dirty="0"/>
-          </a:p>
-          <a:p>
-            <a:r>
-              <a:rPr lang="en-US" sz="1400" dirty="0"/>
-              <a:t>Group N: 10.24.1.111-222</a:t>
-            </a:r>
-          </a:p>
-          <a:p>
-            <a:endParaRPr lang="en-US" sz="1600" dirty="0"/>
           </a:p>
         </p:txBody>
       </p:sp>
@@ -26913,7 +27062,11 @@
           <a:lstStyle/>
           <a:p>
             <a:r>
-              <a:rPr lang="en-US" u="sng" dirty="0"/>
+              <a:rPr lang="en-US" u="sng" dirty="0">
+                <a:solidFill>
+                  <a:srgbClr val="FF0000"/>
+                </a:solidFill>
+              </a:rPr>
               <a:t>AGA act as configuration cache</a:t>
             </a:r>
           </a:p>
@@ -33744,42 +33897,13 @@
         </p:spPr>
         <p:txBody>
           <a:bodyPr>
-            <a:normAutofit fontScale="92500" lnSpcReduction="10000"/>
+            <a:normAutofit/>
           </a:bodyPr>
           <a:lstStyle/>
           <a:p>
             <a:r>
               <a:rPr lang="en-US" u="sng" dirty="0"/>
               <a:t>AGA act as passthrough proxy</a:t>
-            </a:r>
-          </a:p>
-          <a:p>
-            <a:r>
-              <a:rPr lang="en-US" dirty="0"/>
-              <a:t>ACA states: restarted-&gt;running-&gt;</a:t>
-            </a:r>
-            <a:r>
-              <a:rPr lang="en-US" dirty="0" err="1"/>
-              <a:t>out_of_order</a:t>
-            </a:r>
-            <a:r>
-              <a:rPr lang="en-US" dirty="0"/>
-              <a:t>(?)-&gt;</a:t>
-            </a:r>
-            <a:r>
-              <a:rPr lang="en-US" dirty="0" err="1"/>
-              <a:t>unheathly</a:t>
-            </a:r>
-            <a:r>
-              <a:rPr lang="en-US" dirty="0"/>
-              <a:t>(?) </a:t>
-            </a:r>
-          </a:p>
-          <a:p>
-            <a:pPr lvl="1"/>
-            <a:r>
-              <a:rPr lang="en-US" dirty="0"/>
-              <a:t>Note: not sure the need for ACA states</a:t>
             </a:r>
           </a:p>
           <a:p>
@@ -37515,7 +37639,11 @@
           <a:lstStyle/>
           <a:p>
             <a:r>
-              <a:rPr lang="en-US" u="sng" dirty="0"/>
+              <a:rPr lang="en-US" u="sng" dirty="0">
+                <a:solidFill>
+                  <a:srgbClr val="FF0000"/>
+                </a:solidFill>
+              </a:rPr>
               <a:t>AGA act as passthrough proxy</a:t>
             </a:r>
           </a:p>
@@ -39250,7 +39378,11 @@
           <a:lstStyle/>
           <a:p>
             <a:r>
-              <a:rPr lang="en-US" u="sng" dirty="0"/>
+              <a:rPr lang="en-US" u="sng" dirty="0">
+                <a:solidFill>
+                  <a:srgbClr val="FF0000"/>
+                </a:solidFill>
+              </a:rPr>
               <a:t>AGA act as passthrough proxy</a:t>
             </a:r>
           </a:p>
@@ -41022,7 +41154,11 @@
           <a:lstStyle/>
           <a:p>
             <a:r>
-              <a:rPr lang="en-US" u="sng" dirty="0"/>
+              <a:rPr lang="en-US" u="sng" dirty="0">
+                <a:solidFill>
+                  <a:srgbClr val="FF0000"/>
+                </a:solidFill>
+              </a:rPr>
               <a:t>AGA act as passthrough proxy</a:t>
             </a:r>
           </a:p>
@@ -41086,7 +41222,7 @@
             <a:pPr lvl="1"/>
             <a:r>
               <a:rPr lang="en-US" dirty="0"/>
-              <a:t>Update the delete port full state (thinking to keep it instead of deleting the resource entry just in case if ACA ask for it for OOO handling)</a:t>
+              <a:t>Update the delete port full state (thinking to keep it instead of deleting the resource entry just in case if ACA ask for it for OOO handling, unless ACA is using a database that always have full config)</a:t>
             </a:r>
           </a:p>
           <a:p>
@@ -42751,7 +42887,11 @@
           <a:lstStyle/>
           <a:p>
             <a:r>
-              <a:rPr lang="en-US" u="sng" dirty="0"/>
+              <a:rPr lang="en-US" u="sng" dirty="0">
+                <a:solidFill>
+                  <a:srgbClr val="FF0000"/>
+                </a:solidFill>
+              </a:rPr>
               <a:t>AGA act as passthrough proxy</a:t>
             </a:r>
           </a:p>
@@ -42861,7 +43001,11 @@
           </a:p>
           <a:p>
             <a:r>
-              <a:rPr lang="en-US" dirty="0"/>
+              <a:rPr lang="en-US" dirty="0">
+                <a:solidFill>
+                  <a:srgbClr val="FF0000"/>
+                </a:solidFill>
+              </a:rPr>
               <a:t>AGA should be able to reduce the redundant neighbor from sending to ACA, if it is in cache and already sent</a:t>
             </a:r>
           </a:p>
@@ -44538,7 +44682,11 @@
           <a:lstStyle/>
           <a:p>
             <a:r>
-              <a:rPr lang="en-US" u="sng" dirty="0"/>
+              <a:rPr lang="en-US" u="sng" dirty="0">
+                <a:solidFill>
+                  <a:srgbClr val="FF0000"/>
+                </a:solidFill>
+              </a:rPr>
               <a:t>AGA act as passthrough proxy</a:t>
             </a:r>
           </a:p>
@@ -46331,7 +46479,11 @@
           <a:lstStyle/>
           <a:p>
             <a:r>
-              <a:rPr lang="en-US" u="sng" dirty="0"/>
+              <a:rPr lang="en-US" u="sng" dirty="0">
+                <a:solidFill>
+                  <a:srgbClr val="FF0000"/>
+                </a:solidFill>
+              </a:rPr>
               <a:t>AGA act as passthrough proxy</a:t>
             </a:r>
           </a:p>
@@ -46421,7 +46573,7 @@
             <a:pPr lvl="1"/>
             <a:r>
               <a:rPr lang="en-US" dirty="0"/>
-              <a:t>Update the delete neighbor full state (thinking to keep it instead of deleting the resource entry just in case if ACA ask for it for OOO handling)</a:t>
+              <a:t>Update the delete neighbor full state (delete it or keep it for out of order handling?)</a:t>
             </a:r>
           </a:p>
           <a:p>

</xml_diff>